<commit_message>
Slightly edited PPP, added Feeder Mechanism added stuff for subjects
Feeder Mechanism added to work with it
</commit_message>
<xml_diff>
--- a/Mid-term presentation/Template.pptx
+++ b/Mid-term presentation/Template.pptx
@@ -113,6 +113,11 @@
       </a:defRPr>
     </a:lvl9pPr>
   </p:defaultTextStyle>
+  <p:extLst>
+    <p:ext uri="{EFAFB233-063F-42B5-8137-9DF3F51BA10A}">
+      <p15:sldGuideLst xmlns:p15="http://schemas.microsoft.com/office/powerpoint/2012/main"/>
+    </p:ext>
+  </p:extLst>
 </p:presentation>
 </file>
 
@@ -224,7 +229,7 @@
           <a:p>
             <a:fld id="{C9454068-4A27-4115-B733-29A53492B82E}" type="datetimeFigureOut">
               <a:rPr lang="en-GB" smtClean="0"/>
-              <a:t>13/02/2015</a:t>
+              <a:t>26/02/2015</a:t>
             </a:fld>
             <a:endParaRPr lang="en-GB"/>
           </a:p>
@@ -537,523 +542,42 @@
           <a:lstStyle/>
           <a:p>
             <a:r>
-              <a:rPr lang="nl-NL" dirty="0" smtClean="0"/>
+              <a:rPr lang="en-GB" noProof="0" dirty="0" smtClean="0"/>
               <a:t>In</a:t>
             </a:r>
             <a:r>
-              <a:rPr lang="nl-NL" baseline="0" dirty="0" smtClean="0"/>
-              <a:t> </a:t>
-            </a:r>
-            <a:r>
-              <a:rPr lang="nl-NL" baseline="0" dirty="0" err="1" smtClean="0"/>
-              <a:t>daily</a:t>
-            </a:r>
-            <a:r>
-              <a:rPr lang="nl-NL" baseline="0" dirty="0" smtClean="0"/>
-              <a:t> life </a:t>
-            </a:r>
-            <a:r>
-              <a:rPr lang="nl-NL" baseline="0" dirty="0" err="1" smtClean="0"/>
-              <a:t>you</a:t>
-            </a:r>
-            <a:r>
-              <a:rPr lang="nl-NL" baseline="0" dirty="0" smtClean="0"/>
-              <a:t> </a:t>
-            </a:r>
-            <a:r>
-              <a:rPr lang="nl-NL" baseline="0" dirty="0" err="1" smtClean="0"/>
-              <a:t>can</a:t>
-            </a:r>
-            <a:r>
-              <a:rPr lang="nl-NL" baseline="0" dirty="0" smtClean="0"/>
-              <a:t> </a:t>
-            </a:r>
-            <a:r>
-              <a:rPr lang="nl-NL" baseline="0" dirty="0" err="1" smtClean="0"/>
-              <a:t>find</a:t>
-            </a:r>
-            <a:r>
-              <a:rPr lang="nl-NL" baseline="0" dirty="0" smtClean="0"/>
-              <a:t> </a:t>
-            </a:r>
-            <a:r>
-              <a:rPr lang="nl-NL" baseline="0" dirty="0" err="1" smtClean="0"/>
-              <a:t>sorting</a:t>
-            </a:r>
-            <a:r>
-              <a:rPr lang="nl-NL" baseline="0" dirty="0" smtClean="0"/>
-              <a:t> machines </a:t>
-            </a:r>
-            <a:r>
-              <a:rPr lang="nl-NL" baseline="0" dirty="0" err="1" smtClean="0"/>
-              <a:t>everywhere</a:t>
-            </a:r>
-            <a:r>
-              <a:rPr lang="nl-NL" baseline="0" dirty="0" smtClean="0"/>
-              <a:t>, </a:t>
-            </a:r>
-            <a:r>
-              <a:rPr lang="nl-NL" baseline="0" dirty="0" err="1" smtClean="0"/>
-              <a:t>for</a:t>
-            </a:r>
-            <a:r>
-              <a:rPr lang="nl-NL" baseline="0" dirty="0" smtClean="0"/>
-              <a:t> </a:t>
-            </a:r>
-            <a:r>
-              <a:rPr lang="nl-NL" baseline="0" dirty="0" err="1" smtClean="0"/>
-              <a:t>example</a:t>
-            </a:r>
-            <a:r>
-              <a:rPr lang="nl-NL" baseline="0" dirty="0" smtClean="0"/>
-              <a:t> waste </a:t>
-            </a:r>
-            <a:r>
-              <a:rPr lang="nl-NL" baseline="0" dirty="0" err="1" smtClean="0"/>
-              <a:t>distributions</a:t>
-            </a:r>
-            <a:r>
-              <a:rPr lang="nl-NL" baseline="0" dirty="0" smtClean="0"/>
-              <a:t> or </a:t>
-            </a:r>
-            <a:r>
-              <a:rPr lang="nl-NL" baseline="0" dirty="0" err="1" smtClean="0"/>
+              <a:rPr lang="en-GB" baseline="0" noProof="0" dirty="0" smtClean="0"/>
+              <a:t> daily life you can find sorting machines everywhere, for example waste distributions or </a:t>
+            </a:r>
+            <a:r>
+              <a:rPr lang="en-GB" baseline="0" noProof="0" dirty="0" err="1" smtClean="0"/>
               <a:t>PostNL</a:t>
             </a:r>
             <a:r>
-              <a:rPr lang="nl-NL" baseline="0" dirty="0" smtClean="0"/>
-              <a:t>. </a:t>
-            </a:r>
-            <a:r>
-              <a:rPr lang="nl-NL" baseline="0" dirty="0" err="1" smtClean="0"/>
-              <a:t>Could</a:t>
-            </a:r>
-            <a:r>
-              <a:rPr lang="nl-NL" baseline="0" dirty="0" smtClean="0"/>
-              <a:t> </a:t>
-            </a:r>
-            <a:r>
-              <a:rPr lang="nl-NL" baseline="0" dirty="0" err="1" smtClean="0"/>
-              <a:t>you</a:t>
-            </a:r>
-            <a:r>
-              <a:rPr lang="nl-NL" baseline="0" dirty="0" smtClean="0"/>
-              <a:t> </a:t>
-            </a:r>
-            <a:r>
-              <a:rPr lang="nl-NL" baseline="0" dirty="0" err="1" smtClean="0"/>
-              <a:t>imagine</a:t>
-            </a:r>
-            <a:r>
-              <a:rPr lang="nl-NL" baseline="0" dirty="0" smtClean="0"/>
-              <a:t> </a:t>
-            </a:r>
-            <a:r>
-              <a:rPr lang="nl-NL" baseline="0" dirty="0" err="1" smtClean="0"/>
-              <a:t>what</a:t>
-            </a:r>
-            <a:r>
-              <a:rPr lang="nl-NL" baseline="0" dirty="0" smtClean="0"/>
-              <a:t> </a:t>
-            </a:r>
-            <a:r>
-              <a:rPr lang="nl-NL" baseline="0" dirty="0" err="1" smtClean="0"/>
-              <a:t>would</a:t>
-            </a:r>
-            <a:r>
-              <a:rPr lang="nl-NL" baseline="0" dirty="0" smtClean="0"/>
-              <a:t> </a:t>
-            </a:r>
-            <a:r>
-              <a:rPr lang="nl-NL" baseline="0" dirty="0" err="1" smtClean="0"/>
-              <a:t>be</a:t>
-            </a:r>
-            <a:r>
-              <a:rPr lang="nl-NL" baseline="0" dirty="0" smtClean="0"/>
-              <a:t> the </a:t>
-            </a:r>
-            <a:r>
-              <a:rPr lang="nl-NL" baseline="0" dirty="0" err="1" smtClean="0"/>
-              <a:t>consequences</a:t>
-            </a:r>
-            <a:r>
-              <a:rPr lang="nl-NL" baseline="0" dirty="0" smtClean="0"/>
-              <a:t> of </a:t>
-            </a:r>
-            <a:r>
-              <a:rPr lang="nl-NL" baseline="0" dirty="0" err="1" smtClean="0"/>
+              <a:rPr lang="en-GB" baseline="0" noProof="0" dirty="0" smtClean="0"/>
+              <a:t>. Could you imagine what would be the consequences of </a:t>
+            </a:r>
+            <a:r>
+              <a:rPr lang="en-GB" baseline="0" noProof="0" dirty="0" err="1" smtClean="0"/>
               <a:t>disfunctioning</a:t>
             </a:r>
             <a:r>
-              <a:rPr lang="nl-NL" baseline="0" dirty="0" smtClean="0"/>
-              <a:t> </a:t>
-            </a:r>
-            <a:r>
-              <a:rPr lang="nl-NL" baseline="0" dirty="0" err="1" smtClean="0"/>
-              <a:t>sorting</a:t>
-            </a:r>
-            <a:r>
-              <a:rPr lang="nl-NL" baseline="0" dirty="0" smtClean="0"/>
-              <a:t> machines? </a:t>
-            </a:r>
-            <a:r>
-              <a:rPr lang="nl-NL" baseline="0" dirty="0" err="1" smtClean="0"/>
-              <a:t>You</a:t>
-            </a:r>
-            <a:r>
-              <a:rPr lang="nl-NL" baseline="0" dirty="0" smtClean="0"/>
-              <a:t> </a:t>
-            </a:r>
-            <a:r>
-              <a:rPr lang="nl-NL" baseline="0" dirty="0" err="1" smtClean="0"/>
-              <a:t>could</a:t>
-            </a:r>
-            <a:r>
-              <a:rPr lang="nl-NL" baseline="0" dirty="0" smtClean="0"/>
-              <a:t> </a:t>
-            </a:r>
-            <a:r>
-              <a:rPr lang="nl-NL" baseline="0" dirty="0" err="1" smtClean="0"/>
-              <a:t>think</a:t>
-            </a:r>
-            <a:r>
-              <a:rPr lang="nl-NL" baseline="0" dirty="0" smtClean="0"/>
-              <a:t> </a:t>
-            </a:r>
-            <a:r>
-              <a:rPr lang="nl-NL" baseline="0" dirty="0" err="1" smtClean="0"/>
-              <a:t>about</a:t>
-            </a:r>
-            <a:r>
-              <a:rPr lang="nl-NL" baseline="0" dirty="0" smtClean="0"/>
-              <a:t> </a:t>
-            </a:r>
-            <a:r>
-              <a:rPr lang="nl-NL" baseline="0" dirty="0" err="1" smtClean="0"/>
-              <a:t>environmental</a:t>
-            </a:r>
-            <a:r>
-              <a:rPr lang="nl-NL" baseline="0" dirty="0" smtClean="0"/>
-              <a:t> hazards. People do </a:t>
-            </a:r>
-            <a:r>
-              <a:rPr lang="nl-NL" baseline="0" dirty="0" err="1" smtClean="0"/>
-              <a:t>their</a:t>
-            </a:r>
-            <a:r>
-              <a:rPr lang="nl-NL" baseline="0" dirty="0" smtClean="0"/>
-              <a:t> best </a:t>
-            </a:r>
-            <a:r>
-              <a:rPr lang="nl-NL" baseline="0" dirty="0" err="1" smtClean="0"/>
-              <a:t>to</a:t>
-            </a:r>
-            <a:r>
-              <a:rPr lang="nl-NL" baseline="0" dirty="0" smtClean="0"/>
-              <a:t> separate waste, </a:t>
-            </a:r>
-            <a:r>
-              <a:rPr lang="nl-NL" baseline="0" dirty="0" err="1" smtClean="0"/>
-              <a:t>so</a:t>
-            </a:r>
-            <a:r>
-              <a:rPr lang="nl-NL" baseline="0" dirty="0" smtClean="0"/>
-              <a:t> </a:t>
-            </a:r>
-            <a:r>
-              <a:rPr lang="nl-NL" baseline="0" dirty="0" err="1" smtClean="0"/>
-              <a:t>if</a:t>
-            </a:r>
-            <a:r>
-              <a:rPr lang="nl-NL" baseline="0" dirty="0" smtClean="0"/>
-              <a:t> </a:t>
-            </a:r>
-            <a:r>
-              <a:rPr lang="nl-NL" baseline="0" dirty="0" err="1" smtClean="0"/>
-              <a:t>it</a:t>
-            </a:r>
-            <a:r>
-              <a:rPr lang="nl-NL" baseline="0" dirty="0" smtClean="0"/>
-              <a:t> </a:t>
-            </a:r>
-            <a:r>
-              <a:rPr lang="nl-NL" baseline="0" dirty="0" err="1" smtClean="0"/>
-              <a:t>comes</a:t>
-            </a:r>
-            <a:r>
-              <a:rPr lang="nl-NL" baseline="0" dirty="0" smtClean="0"/>
-              <a:t> </a:t>
-            </a:r>
-            <a:r>
-              <a:rPr lang="nl-NL" baseline="0" dirty="0" err="1" smtClean="0"/>
-              <a:t>together</a:t>
-            </a:r>
-            <a:r>
-              <a:rPr lang="nl-NL" baseline="0" dirty="0" smtClean="0"/>
-              <a:t> </a:t>
-            </a:r>
-            <a:r>
-              <a:rPr lang="nl-NL" baseline="0" dirty="0" err="1" smtClean="0"/>
-              <a:t>anyways</a:t>
-            </a:r>
-            <a:endParaRPr lang="nl-NL" baseline="0" dirty="0" smtClean="0"/>
-          </a:p>
-          <a:p>
-            <a:r>
-              <a:rPr lang="nl-NL" baseline="0" dirty="0" err="1" smtClean="0"/>
-              <a:t>So</a:t>
-            </a:r>
-            <a:r>
-              <a:rPr lang="nl-NL" baseline="0" dirty="0" smtClean="0"/>
-              <a:t> </a:t>
-            </a:r>
-            <a:r>
-              <a:rPr lang="nl-NL" baseline="0" dirty="0" err="1" smtClean="0"/>
-              <a:t>it’s</a:t>
-            </a:r>
-            <a:r>
-              <a:rPr lang="nl-NL" baseline="0" dirty="0" smtClean="0"/>
-              <a:t> important </a:t>
-            </a:r>
-            <a:r>
-              <a:rPr lang="nl-NL" baseline="0" dirty="0" err="1" smtClean="0"/>
-              <a:t>that</a:t>
-            </a:r>
-            <a:r>
-              <a:rPr lang="nl-NL" baseline="0" dirty="0" smtClean="0"/>
-              <a:t> </a:t>
-            </a:r>
-            <a:r>
-              <a:rPr lang="nl-NL" baseline="0" dirty="0" err="1" smtClean="0"/>
-              <a:t>sorting</a:t>
-            </a:r>
-            <a:r>
-              <a:rPr lang="nl-NL" baseline="0" dirty="0" smtClean="0"/>
-              <a:t> machines </a:t>
-            </a:r>
-            <a:r>
-              <a:rPr lang="nl-NL" baseline="0" dirty="0" err="1" smtClean="0"/>
-              <a:t>work</a:t>
-            </a:r>
-            <a:r>
-              <a:rPr lang="nl-NL" baseline="0" dirty="0" smtClean="0"/>
-              <a:t> as </a:t>
-            </a:r>
-            <a:r>
-              <a:rPr lang="nl-NL" baseline="0" dirty="0" err="1" smtClean="0"/>
-              <a:t>efficient</a:t>
-            </a:r>
-            <a:r>
-              <a:rPr lang="nl-NL" baseline="0" dirty="0" smtClean="0"/>
-              <a:t> as </a:t>
-            </a:r>
-            <a:r>
-              <a:rPr lang="nl-NL" baseline="0" dirty="0" err="1" smtClean="0"/>
-              <a:t>possible</a:t>
-            </a:r>
-            <a:r>
-              <a:rPr lang="nl-NL" baseline="0" dirty="0" smtClean="0"/>
-              <a:t>. </a:t>
-            </a:r>
-            <a:r>
-              <a:rPr lang="nl-NL" baseline="0" dirty="0" err="1" smtClean="0"/>
-              <a:t>Our</a:t>
-            </a:r>
-            <a:r>
-              <a:rPr lang="nl-NL" baseline="0" dirty="0" smtClean="0"/>
-              <a:t> team has </a:t>
-            </a:r>
-            <a:r>
-              <a:rPr lang="nl-NL" baseline="0" dirty="0" err="1" smtClean="0"/>
-              <a:t>chosen</a:t>
-            </a:r>
-            <a:r>
-              <a:rPr lang="nl-NL" baseline="0" dirty="0" smtClean="0"/>
-              <a:t> </a:t>
-            </a:r>
-            <a:r>
-              <a:rPr lang="nl-NL" baseline="0" dirty="0" err="1" smtClean="0"/>
-              <a:t>to</a:t>
-            </a:r>
-            <a:r>
-              <a:rPr lang="nl-NL" baseline="0" dirty="0" smtClean="0"/>
-              <a:t> </a:t>
-            </a:r>
-            <a:r>
-              <a:rPr lang="nl-NL" baseline="0" dirty="0" err="1" smtClean="0"/>
-              <a:t>build</a:t>
-            </a:r>
-            <a:r>
-              <a:rPr lang="nl-NL" baseline="0" dirty="0" smtClean="0"/>
-              <a:t> </a:t>
-            </a:r>
-            <a:r>
-              <a:rPr lang="nl-NL" baseline="0" dirty="0" err="1" smtClean="0"/>
-              <a:t>sorting</a:t>
-            </a:r>
-            <a:r>
-              <a:rPr lang="nl-NL" baseline="0" dirty="0" smtClean="0"/>
-              <a:t> machine as accurate as </a:t>
-            </a:r>
-            <a:r>
-              <a:rPr lang="nl-NL" baseline="0" dirty="0" err="1" smtClean="0"/>
-              <a:t>possible</a:t>
-            </a:r>
-            <a:r>
-              <a:rPr lang="nl-NL" baseline="0" dirty="0" smtClean="0"/>
-              <a:t>. </a:t>
-            </a:r>
-            <a:r>
-              <a:rPr lang="nl-NL" baseline="0" dirty="0" err="1" smtClean="0"/>
-              <a:t>Another</a:t>
-            </a:r>
-            <a:r>
-              <a:rPr lang="nl-NL" baseline="0" dirty="0" smtClean="0"/>
-              <a:t> </a:t>
-            </a:r>
-            <a:r>
-              <a:rPr lang="nl-NL" baseline="0" dirty="0" err="1" smtClean="0"/>
-              <a:t>objective</a:t>
-            </a:r>
-            <a:r>
-              <a:rPr lang="nl-NL" baseline="0" dirty="0" smtClean="0"/>
-              <a:t> of </a:t>
-            </a:r>
-            <a:r>
-              <a:rPr lang="nl-NL" baseline="0" dirty="0" err="1" smtClean="0"/>
-              <a:t>this</a:t>
-            </a:r>
-            <a:r>
-              <a:rPr lang="nl-NL" baseline="0" dirty="0" smtClean="0"/>
-              <a:t> project is </a:t>
-            </a:r>
-            <a:r>
-              <a:rPr lang="nl-NL" baseline="0" dirty="0" err="1" smtClean="0"/>
-              <a:t>that</a:t>
-            </a:r>
-            <a:r>
-              <a:rPr lang="nl-NL" baseline="0" dirty="0" smtClean="0"/>
-              <a:t> we </a:t>
-            </a:r>
-            <a:r>
-              <a:rPr lang="nl-NL" baseline="0" dirty="0" err="1" smtClean="0"/>
-              <a:t>learn</a:t>
-            </a:r>
-            <a:r>
-              <a:rPr lang="nl-NL" baseline="0" dirty="0" smtClean="0"/>
-              <a:t> </a:t>
-            </a:r>
-            <a:r>
-              <a:rPr lang="nl-NL" baseline="0" dirty="0" err="1" smtClean="0"/>
-              <a:t>to</a:t>
-            </a:r>
-            <a:r>
-              <a:rPr lang="nl-NL" baseline="0" dirty="0" smtClean="0"/>
-              <a:t> </a:t>
-            </a:r>
-            <a:r>
-              <a:rPr lang="nl-NL" baseline="0" dirty="0" err="1" smtClean="0"/>
-              <a:t>work</a:t>
-            </a:r>
-            <a:r>
-              <a:rPr lang="nl-NL" baseline="0" dirty="0" smtClean="0"/>
-              <a:t> </a:t>
-            </a:r>
-            <a:r>
-              <a:rPr lang="nl-NL" baseline="0" dirty="0" err="1" smtClean="0"/>
-              <a:t>together</a:t>
-            </a:r>
-            <a:r>
-              <a:rPr lang="nl-NL" baseline="0" dirty="0" smtClean="0"/>
-              <a:t> as a team. </a:t>
-            </a:r>
-          </a:p>
-          <a:p>
-            <a:r>
-              <a:rPr lang="nl-NL" baseline="0" dirty="0" smtClean="0"/>
-              <a:t>In </a:t>
-            </a:r>
-            <a:r>
-              <a:rPr lang="nl-NL" baseline="0" dirty="0" err="1" smtClean="0"/>
-              <a:t>this</a:t>
-            </a:r>
-            <a:r>
-              <a:rPr lang="nl-NL" baseline="0" dirty="0" smtClean="0"/>
-              <a:t> </a:t>
-            </a:r>
-            <a:r>
-              <a:rPr lang="nl-NL" baseline="0" dirty="0" err="1" smtClean="0"/>
-              <a:t>presentation</a:t>
-            </a:r>
-            <a:r>
-              <a:rPr lang="nl-NL" baseline="0" dirty="0" smtClean="0"/>
-              <a:t> we are </a:t>
-            </a:r>
-            <a:r>
-              <a:rPr lang="nl-NL" baseline="0" dirty="0" err="1" smtClean="0"/>
-              <a:t>going</a:t>
-            </a:r>
-            <a:r>
-              <a:rPr lang="nl-NL" baseline="0" dirty="0" smtClean="0"/>
-              <a:t> </a:t>
-            </a:r>
-            <a:r>
-              <a:rPr lang="nl-NL" baseline="0" dirty="0" err="1" smtClean="0"/>
-              <a:t>to</a:t>
-            </a:r>
-            <a:r>
-              <a:rPr lang="nl-NL" baseline="0" dirty="0" smtClean="0"/>
-              <a:t> </a:t>
-            </a:r>
-            <a:r>
-              <a:rPr lang="nl-NL" baseline="0" dirty="0" err="1" smtClean="0"/>
-              <a:t>inform</a:t>
-            </a:r>
-            <a:r>
-              <a:rPr lang="nl-NL" baseline="0" dirty="0" smtClean="0"/>
-              <a:t> </a:t>
-            </a:r>
-            <a:r>
-              <a:rPr lang="nl-NL" baseline="0" dirty="0" err="1" smtClean="0"/>
-              <a:t>you</a:t>
-            </a:r>
-            <a:r>
-              <a:rPr lang="nl-NL" baseline="0" dirty="0" smtClean="0"/>
-              <a:t> </a:t>
-            </a:r>
-            <a:r>
-              <a:rPr lang="nl-NL" baseline="0" dirty="0" err="1" smtClean="0"/>
-              <a:t>about</a:t>
-            </a:r>
-            <a:r>
-              <a:rPr lang="nl-NL" baseline="0" dirty="0" smtClean="0"/>
-              <a:t> </a:t>
-            </a:r>
-            <a:r>
-              <a:rPr lang="nl-NL" baseline="0" dirty="0" err="1" smtClean="0"/>
-              <a:t>our</a:t>
-            </a:r>
-            <a:r>
-              <a:rPr lang="nl-NL" baseline="0" dirty="0" smtClean="0"/>
-              <a:t> </a:t>
-            </a:r>
-            <a:r>
-              <a:rPr lang="nl-NL" baseline="0" dirty="0" err="1" smtClean="0"/>
-              <a:t>progress</a:t>
-            </a:r>
-            <a:r>
-              <a:rPr lang="nl-NL" baseline="0" dirty="0" smtClean="0"/>
-              <a:t> </a:t>
-            </a:r>
-            <a:r>
-              <a:rPr lang="nl-NL" baseline="0" dirty="0" err="1" smtClean="0"/>
-              <a:t>so</a:t>
-            </a:r>
-            <a:r>
-              <a:rPr lang="nl-NL" baseline="0" dirty="0" smtClean="0"/>
-              <a:t> far. </a:t>
-            </a:r>
-            <a:endParaRPr lang="en-GB" dirty="0"/>
+              <a:rPr lang="en-GB" baseline="0" noProof="0" dirty="0" smtClean="0"/>
+              <a:t> sorting machines? You could think about environmental hazards. People do their best to separate waste, so if it comes together anyways</a:t>
+            </a:r>
+          </a:p>
+          <a:p>
+            <a:r>
+              <a:rPr lang="en-GB" baseline="0" noProof="0" dirty="0" smtClean="0"/>
+              <a:t>So it’s important that sorting machines work as efficient as possible. Our team has chosen to build sorting machine as accurate as possible. Another objective of this project is that we learn to work together as a team. </a:t>
+            </a:r>
+          </a:p>
+          <a:p>
+            <a:r>
+              <a:rPr lang="en-GB" baseline="0" noProof="0" dirty="0" smtClean="0"/>
+              <a:t>In this presentation we are going to inform you about our progress so far. </a:t>
+            </a:r>
+            <a:endParaRPr lang="en-GB" noProof="0" dirty="0"/>
           </a:p>
         </p:txBody>
       </p:sp>
@@ -1411,7 +935,7 @@
           <a:p>
             <a:fld id="{4AAD347D-5ACD-4C99-B74B-A9C85AD731AF}" type="datetimeFigureOut">
               <a:rPr lang="en-US" dirty="0"/>
-              <a:t>2/13/2015</a:t>
+              <a:t>2/26/2015</a:t>
             </a:fld>
             <a:endParaRPr lang="en-US" dirty="0"/>
           </a:p>
@@ -1681,7 +1205,7 @@
           <a:p>
             <a:fld id="{4509A250-FF31-4206-8172-F9D3106AACB1}" type="datetimeFigureOut">
               <a:rPr lang="en-US" dirty="0"/>
-              <a:t>2/13/2015</a:t>
+              <a:t>2/26/2015</a:t>
             </a:fld>
             <a:endParaRPr lang="en-US" dirty="0"/>
           </a:p>
@@ -1870,7 +1394,7 @@
           <a:p>
             <a:fld id="{4509A250-FF31-4206-8172-F9D3106AACB1}" type="datetimeFigureOut">
               <a:rPr lang="en-US" dirty="0"/>
-              <a:t>2/13/2015</a:t>
+              <a:t>2/26/2015</a:t>
             </a:fld>
             <a:endParaRPr lang="en-US" dirty="0"/>
           </a:p>
@@ -2138,7 +1662,7 @@
           <a:p>
             <a:fld id="{4509A250-FF31-4206-8172-F9D3106AACB1}" type="datetimeFigureOut">
               <a:rPr lang="en-US" dirty="0"/>
-              <a:t>2/13/2015</a:t>
+              <a:t>2/26/2015</a:t>
             </a:fld>
             <a:endParaRPr lang="en-US" dirty="0"/>
           </a:p>
@@ -2474,7 +1998,7 @@
           <a:p>
             <a:fld id="{4509A250-FF31-4206-8172-F9D3106AACB1}" type="datetimeFigureOut">
               <a:rPr lang="en-US" dirty="0"/>
-              <a:t>2/13/2015</a:t>
+              <a:t>2/26/2015</a:t>
             </a:fld>
             <a:endParaRPr lang="en-US" dirty="0"/>
           </a:p>
@@ -3092,7 +2616,7 @@
           <a:p>
             <a:fld id="{4509A250-FF31-4206-8172-F9D3106AACB1}" type="datetimeFigureOut">
               <a:rPr lang="en-US" dirty="0"/>
-              <a:t>2/13/2015</a:t>
+              <a:t>2/26/2015</a:t>
             </a:fld>
             <a:endParaRPr lang="en-US" dirty="0"/>
           </a:p>
@@ -3947,7 +3471,7 @@
           <a:p>
             <a:fld id="{4509A250-FF31-4206-8172-F9D3106AACB1}" type="datetimeFigureOut">
               <a:rPr lang="en-US" dirty="0"/>
-              <a:t>2/13/2015</a:t>
+              <a:t>2/26/2015</a:t>
             </a:fld>
             <a:endParaRPr lang="en-US" dirty="0"/>
           </a:p>
@@ -4112,7 +3636,7 @@
           <a:p>
             <a:fld id="{4509A250-FF31-4206-8172-F9D3106AACB1}" type="datetimeFigureOut">
               <a:rPr lang="en-US" dirty="0"/>
-              <a:t>2/13/2015</a:t>
+              <a:t>2/26/2015</a:t>
             </a:fld>
             <a:endParaRPr lang="en-US" dirty="0"/>
           </a:p>
@@ -4287,7 +3811,7 @@
           <a:p>
             <a:fld id="{4509A250-FF31-4206-8172-F9D3106AACB1}" type="datetimeFigureOut">
               <a:rPr lang="en-US" dirty="0"/>
-              <a:t>2/13/2015</a:t>
+              <a:t>2/26/2015</a:t>
             </a:fld>
             <a:endParaRPr lang="en-US" dirty="0"/>
           </a:p>
@@ -4452,7 +3976,7 @@
           <a:p>
             <a:fld id="{4509A250-FF31-4206-8172-F9D3106AACB1}" type="datetimeFigureOut">
               <a:rPr lang="en-US" dirty="0"/>
-              <a:t>2/13/2015</a:t>
+              <a:t>2/26/2015</a:t>
             </a:fld>
             <a:endParaRPr lang="en-US" dirty="0"/>
           </a:p>
@@ -4694,7 +4218,7 @@
           <a:p>
             <a:fld id="{9796027F-7875-4030-9381-8BD8C4F21935}" type="datetimeFigureOut">
               <a:rPr lang="en-US" dirty="0"/>
-              <a:t>2/13/2015</a:t>
+              <a:t>2/26/2015</a:t>
             </a:fld>
             <a:endParaRPr lang="en-US" dirty="0"/>
           </a:p>
@@ -4981,7 +4505,7 @@
           <a:p>
             <a:fld id="{9796027F-7875-4030-9381-8BD8C4F21935}" type="datetimeFigureOut">
               <a:rPr lang="en-US" dirty="0"/>
-              <a:t>2/13/2015</a:t>
+              <a:t>2/26/2015</a:t>
             </a:fld>
             <a:endParaRPr lang="en-US" dirty="0"/>
           </a:p>
@@ -5420,7 +4944,7 @@
           <a:p>
             <a:fld id="{9796027F-7875-4030-9381-8BD8C4F21935}" type="datetimeFigureOut">
               <a:rPr lang="en-US" dirty="0"/>
-              <a:t>2/13/2015</a:t>
+              <a:t>2/26/2015</a:t>
             </a:fld>
             <a:endParaRPr lang="en-US" dirty="0"/>
           </a:p>
@@ -5533,7 +5057,7 @@
           <a:p>
             <a:fld id="{4509A250-FF31-4206-8172-F9D3106AACB1}" type="datetimeFigureOut">
               <a:rPr lang="en-US" dirty="0"/>
-              <a:t>2/13/2015</a:t>
+              <a:t>2/26/2015</a:t>
             </a:fld>
             <a:endParaRPr lang="en-US" dirty="0"/>
           </a:p>
@@ -5623,7 +5147,7 @@
           <a:p>
             <a:fld id="{4509A250-FF31-4206-8172-F9D3106AACB1}" type="datetimeFigureOut">
               <a:rPr lang="en-US" dirty="0"/>
-              <a:t>2/13/2015</a:t>
+              <a:t>2/26/2015</a:t>
             </a:fld>
             <a:endParaRPr lang="en-US" dirty="0"/>
           </a:p>
@@ -5897,7 +5421,7 @@
           <a:p>
             <a:fld id="{4509A250-FF31-4206-8172-F9D3106AACB1}" type="datetimeFigureOut">
               <a:rPr lang="en-US" dirty="0"/>
-              <a:t>2/13/2015</a:t>
+              <a:t>2/26/2015</a:t>
             </a:fld>
             <a:endParaRPr lang="en-US" dirty="0"/>
           </a:p>
@@ -6167,7 +5691,7 @@
           <a:p>
             <a:fld id="{4509A250-FF31-4206-8172-F9D3106AACB1}" type="datetimeFigureOut">
               <a:rPr lang="en-US" dirty="0"/>
-              <a:t>2/13/2015</a:t>
+              <a:t>2/26/2015</a:t>
             </a:fld>
             <a:endParaRPr lang="en-US" dirty="0"/>
           </a:p>
@@ -6591,7 +6115,7 @@
           <a:p>
             <a:fld id="{4AAD347D-5ACD-4C99-B74B-A9C85AD731AF}" type="datetimeFigureOut">
               <a:rPr lang="en-US" dirty="0"/>
-              <a:t>2/13/2015</a:t>
+              <a:t>2/26/2015</a:t>
             </a:fld>
             <a:endParaRPr lang="en-US" dirty="0"/>
           </a:p>

</xml_diff>